<commit_message>
added 002 + templates for 003-010 + congrats
</commit_message>
<xml_diff>
--- a/images/resources/resources.pptx
+++ b/images/resources/resources.pptx
@@ -6,6 +6,7 @@
   </p:sldMasterIdLst>
   <p:sldIdLst>
     <p:sldId id="256" r:id="rId2"/>
+    <p:sldId id="257" r:id="rId3"/>
   </p:sldIdLst>
   <p:sldSz cx="12192000" cy="6858000"/>
   <p:notesSz cx="6858000" cy="9144000"/>
@@ -104,6 +105,11 @@
       </a:defRPr>
     </a:lvl9pPr>
   </p:defaultTextStyle>
+  <p:extLst>
+    <p:ext uri="{EFAFB233-063F-42B5-8137-9DF3F51BA10A}">
+      <p15:sldGuideLst xmlns:p15="http://schemas.microsoft.com/office/powerpoint/2012/main"/>
+    </p:ext>
+  </p:extLst>
 </p:presentation>
 </file>
 
@@ -254,7 +260,7 @@
           <a:p>
             <a:fld id="{9844EE4B-68D4-4DD6-916E-B6BD3677EE44}" type="datetimeFigureOut">
               <a:rPr lang="en-US" smtClean="0"/>
-              <a:t>1/25/2019</a:t>
+              <a:t>1/27/2019</a:t>
             </a:fld>
             <a:endParaRPr lang="en-US"/>
           </a:p>
@@ -452,7 +458,7 @@
           <a:p>
             <a:fld id="{9844EE4B-68D4-4DD6-916E-B6BD3677EE44}" type="datetimeFigureOut">
               <a:rPr lang="en-US" smtClean="0"/>
-              <a:t>1/25/2019</a:t>
+              <a:t>1/27/2019</a:t>
             </a:fld>
             <a:endParaRPr lang="en-US"/>
           </a:p>
@@ -660,7 +666,7 @@
           <a:p>
             <a:fld id="{9844EE4B-68D4-4DD6-916E-B6BD3677EE44}" type="datetimeFigureOut">
               <a:rPr lang="en-US" smtClean="0"/>
-              <a:t>1/25/2019</a:t>
+              <a:t>1/27/2019</a:t>
             </a:fld>
             <a:endParaRPr lang="en-US"/>
           </a:p>
@@ -858,7 +864,7 @@
           <a:p>
             <a:fld id="{9844EE4B-68D4-4DD6-916E-B6BD3677EE44}" type="datetimeFigureOut">
               <a:rPr lang="en-US" smtClean="0"/>
-              <a:t>1/25/2019</a:t>
+              <a:t>1/27/2019</a:t>
             </a:fld>
             <a:endParaRPr lang="en-US"/>
           </a:p>
@@ -1133,7 +1139,7 @@
           <a:p>
             <a:fld id="{9844EE4B-68D4-4DD6-916E-B6BD3677EE44}" type="datetimeFigureOut">
               <a:rPr lang="en-US" smtClean="0"/>
-              <a:t>1/25/2019</a:t>
+              <a:t>1/27/2019</a:t>
             </a:fld>
             <a:endParaRPr lang="en-US"/>
           </a:p>
@@ -1398,7 +1404,7 @@
           <a:p>
             <a:fld id="{9844EE4B-68D4-4DD6-916E-B6BD3677EE44}" type="datetimeFigureOut">
               <a:rPr lang="en-US" smtClean="0"/>
-              <a:t>1/25/2019</a:t>
+              <a:t>1/27/2019</a:t>
             </a:fld>
             <a:endParaRPr lang="en-US"/>
           </a:p>
@@ -1810,7 +1816,7 @@
           <a:p>
             <a:fld id="{9844EE4B-68D4-4DD6-916E-B6BD3677EE44}" type="datetimeFigureOut">
               <a:rPr lang="en-US" smtClean="0"/>
-              <a:t>1/25/2019</a:t>
+              <a:t>1/27/2019</a:t>
             </a:fld>
             <a:endParaRPr lang="en-US"/>
           </a:p>
@@ -1951,7 +1957,7 @@
           <a:p>
             <a:fld id="{9844EE4B-68D4-4DD6-916E-B6BD3677EE44}" type="datetimeFigureOut">
               <a:rPr lang="en-US" smtClean="0"/>
-              <a:t>1/25/2019</a:t>
+              <a:t>1/27/2019</a:t>
             </a:fld>
             <a:endParaRPr lang="en-US"/>
           </a:p>
@@ -2064,7 +2070,7 @@
           <a:p>
             <a:fld id="{9844EE4B-68D4-4DD6-916E-B6BD3677EE44}" type="datetimeFigureOut">
               <a:rPr lang="en-US" smtClean="0"/>
-              <a:t>1/25/2019</a:t>
+              <a:t>1/27/2019</a:t>
             </a:fld>
             <a:endParaRPr lang="en-US"/>
           </a:p>
@@ -2375,7 +2381,7 @@
           <a:p>
             <a:fld id="{9844EE4B-68D4-4DD6-916E-B6BD3677EE44}" type="datetimeFigureOut">
               <a:rPr lang="en-US" smtClean="0"/>
-              <a:t>1/25/2019</a:t>
+              <a:t>1/27/2019</a:t>
             </a:fld>
             <a:endParaRPr lang="en-US"/>
           </a:p>
@@ -2663,7 +2669,7 @@
           <a:p>
             <a:fld id="{9844EE4B-68D4-4DD6-916E-B6BD3677EE44}" type="datetimeFigureOut">
               <a:rPr lang="en-US" smtClean="0"/>
-              <a:t>1/25/2019</a:t>
+              <a:t>1/27/2019</a:t>
             </a:fld>
             <a:endParaRPr lang="en-US"/>
           </a:p>
@@ -2904,7 +2910,7 @@
           <a:p>
             <a:fld id="{9844EE4B-68D4-4DD6-916E-B6BD3677EE44}" type="datetimeFigureOut">
               <a:rPr lang="en-US" smtClean="0"/>
-              <a:t>1/25/2019</a:t>
+              <a:t>1/27/2019</a:t>
             </a:fld>
             <a:endParaRPr lang="en-US"/>
           </a:p>
@@ -3820,6 +3826,99 @@
 </p:sld>
 </file>
 
+<file path=ppt/slides/slide2.xml><?xml version="1.0" encoding="utf-8"?>
+<p:sld xmlns:a="http://schemas.openxmlformats.org/drawingml/2006/main" xmlns:r="http://schemas.openxmlformats.org/officeDocument/2006/relationships" xmlns:p="http://schemas.openxmlformats.org/presentationml/2006/main">
+  <p:cSld>
+    <p:spTree>
+      <p:nvGrpSpPr>
+        <p:cNvPr id="1" name=""/>
+        <p:cNvGrpSpPr/>
+        <p:nvPr/>
+      </p:nvGrpSpPr>
+      <p:grpSpPr>
+        <a:xfrm>
+          <a:off x="0" y="0"/>
+          <a:ext cx="0" cy="0"/>
+          <a:chOff x="0" y="0"/>
+          <a:chExt cx="0" cy="0"/>
+        </a:xfrm>
+      </p:grpSpPr>
+      <p:sp>
+        <p:nvSpPr>
+          <p:cNvPr id="2" name="Rectangle 1">
+            <a:extLst>
+              <a:ext uri="{FF2B5EF4-FFF2-40B4-BE49-F238E27FC236}">
+                <a16:creationId xmlns:a16="http://schemas.microsoft.com/office/drawing/2014/main" id="{8D9DA941-1AE5-45DE-B138-93156C257564}"/>
+              </a:ext>
+            </a:extLst>
+          </p:cNvPr>
+          <p:cNvSpPr/>
+          <p:nvPr/>
+        </p:nvSpPr>
+        <p:spPr>
+          <a:xfrm rot="21381319">
+            <a:off x="658761" y="2005502"/>
+            <a:ext cx="10943303" cy="2519065"/>
+          </a:xfrm>
+          <a:prstGeom prst="rect">
+            <a:avLst/>
+          </a:prstGeom>
+          <a:noFill/>
+        </p:spPr>
+        <p:txBody>
+          <a:bodyPr wrap="none" lIns="91440" tIns="45720" rIns="91440" bIns="45720">
+            <a:prstTxWarp prst="textCanDown">
+              <a:avLst>
+                <a:gd name="adj" fmla="val 12201"/>
+              </a:avLst>
+            </a:prstTxWarp>
+            <a:spAutoFit/>
+            <a:scene3d>
+              <a:camera prst="orthographicFront"/>
+              <a:lightRig rig="soft" dir="t">
+                <a:rot lat="0" lon="0" rev="15600000"/>
+              </a:lightRig>
+            </a:scene3d>
+            <a:sp3d extrusionH="57150" prstMaterial="softEdge">
+              <a:bevelT w="25400" h="38100"/>
+            </a:sp3d>
+          </a:bodyPr>
+          <a:lstStyle/>
+          <a:p>
+            <a:pPr algn="ctr"/>
+            <a:r>
+              <a:rPr lang="en-US" sz="7200" b="1" cap="none" spc="0" dirty="0">
+                <a:ln/>
+                <a:solidFill>
+                  <a:srgbClr val="FFC000"/>
+                </a:solidFill>
+                <a:effectLst>
+                  <a:outerShdw blurRad="38100" dist="38100" dir="2700000" algn="tl">
+                    <a:srgbClr val="000000">
+                      <a:alpha val="43137"/>
+                    </a:srgbClr>
+                  </a:outerShdw>
+                </a:effectLst>
+                <a:latin typeface="Vladimir Script" panose="03050402040407070305" pitchFamily="66" charset="0"/>
+              </a:rPr>
+              <a:t>Congratulations !</a:t>
+            </a:r>
+          </a:p>
+        </p:txBody>
+      </p:sp>
+    </p:spTree>
+    <p:extLst>
+      <p:ext uri="{BB962C8B-B14F-4D97-AF65-F5344CB8AC3E}">
+        <p14:creationId xmlns:p14="http://schemas.microsoft.com/office/powerpoint/2010/main" val="3465555654"/>
+      </p:ext>
+    </p:extLst>
+  </p:cSld>
+  <p:clrMapOvr>
+    <a:masterClrMapping/>
+  </p:clrMapOvr>
+</p:sld>
+</file>
+
 <file path=ppt/theme/theme1.xml><?xml version="1.0" encoding="utf-8"?>
 <a:theme xmlns:a="http://schemas.openxmlformats.org/drawingml/2006/main" name="Office Theme">
   <a:themeElements>

</xml_diff>

<commit_message>
added 'more info' icon + PEP8 to 000
</commit_message>
<xml_diff>
--- a/images/resources/resources.pptx
+++ b/images/resources/resources.pptx
@@ -6,7 +6,8 @@
   </p:sldMasterIdLst>
   <p:sldIdLst>
     <p:sldId id="256" r:id="rId2"/>
-    <p:sldId id="257" r:id="rId3"/>
+    <p:sldId id="258" r:id="rId3"/>
+    <p:sldId id="257" r:id="rId4"/>
   </p:sldIdLst>
   <p:sldSz cx="12192000" cy="6858000"/>
   <p:notesSz cx="6858000" cy="9144000"/>
@@ -260,7 +261,7 @@
           <a:p>
             <a:fld id="{9844EE4B-68D4-4DD6-916E-B6BD3677EE44}" type="datetimeFigureOut">
               <a:rPr lang="en-US" smtClean="0"/>
-              <a:t>1/27/2019</a:t>
+              <a:t>2/2/2019</a:t>
             </a:fld>
             <a:endParaRPr lang="en-US"/>
           </a:p>
@@ -458,7 +459,7 @@
           <a:p>
             <a:fld id="{9844EE4B-68D4-4DD6-916E-B6BD3677EE44}" type="datetimeFigureOut">
               <a:rPr lang="en-US" smtClean="0"/>
-              <a:t>1/27/2019</a:t>
+              <a:t>2/2/2019</a:t>
             </a:fld>
             <a:endParaRPr lang="en-US"/>
           </a:p>
@@ -666,7 +667,7 @@
           <a:p>
             <a:fld id="{9844EE4B-68D4-4DD6-916E-B6BD3677EE44}" type="datetimeFigureOut">
               <a:rPr lang="en-US" smtClean="0"/>
-              <a:t>1/27/2019</a:t>
+              <a:t>2/2/2019</a:t>
             </a:fld>
             <a:endParaRPr lang="en-US"/>
           </a:p>
@@ -864,7 +865,7 @@
           <a:p>
             <a:fld id="{9844EE4B-68D4-4DD6-916E-B6BD3677EE44}" type="datetimeFigureOut">
               <a:rPr lang="en-US" smtClean="0"/>
-              <a:t>1/27/2019</a:t>
+              <a:t>2/2/2019</a:t>
             </a:fld>
             <a:endParaRPr lang="en-US"/>
           </a:p>
@@ -1139,7 +1140,7 @@
           <a:p>
             <a:fld id="{9844EE4B-68D4-4DD6-916E-B6BD3677EE44}" type="datetimeFigureOut">
               <a:rPr lang="en-US" smtClean="0"/>
-              <a:t>1/27/2019</a:t>
+              <a:t>2/2/2019</a:t>
             </a:fld>
             <a:endParaRPr lang="en-US"/>
           </a:p>
@@ -1404,7 +1405,7 @@
           <a:p>
             <a:fld id="{9844EE4B-68D4-4DD6-916E-B6BD3677EE44}" type="datetimeFigureOut">
               <a:rPr lang="en-US" smtClean="0"/>
-              <a:t>1/27/2019</a:t>
+              <a:t>2/2/2019</a:t>
             </a:fld>
             <a:endParaRPr lang="en-US"/>
           </a:p>
@@ -1816,7 +1817,7 @@
           <a:p>
             <a:fld id="{9844EE4B-68D4-4DD6-916E-B6BD3677EE44}" type="datetimeFigureOut">
               <a:rPr lang="en-US" smtClean="0"/>
-              <a:t>1/27/2019</a:t>
+              <a:t>2/2/2019</a:t>
             </a:fld>
             <a:endParaRPr lang="en-US"/>
           </a:p>
@@ -1957,7 +1958,7 @@
           <a:p>
             <a:fld id="{9844EE4B-68D4-4DD6-916E-B6BD3677EE44}" type="datetimeFigureOut">
               <a:rPr lang="en-US" smtClean="0"/>
-              <a:t>1/27/2019</a:t>
+              <a:t>2/2/2019</a:t>
             </a:fld>
             <a:endParaRPr lang="en-US"/>
           </a:p>
@@ -2070,7 +2071,7 @@
           <a:p>
             <a:fld id="{9844EE4B-68D4-4DD6-916E-B6BD3677EE44}" type="datetimeFigureOut">
               <a:rPr lang="en-US" smtClean="0"/>
-              <a:t>1/27/2019</a:t>
+              <a:t>2/2/2019</a:t>
             </a:fld>
             <a:endParaRPr lang="en-US"/>
           </a:p>
@@ -2381,7 +2382,7 @@
           <a:p>
             <a:fld id="{9844EE4B-68D4-4DD6-916E-B6BD3677EE44}" type="datetimeFigureOut">
               <a:rPr lang="en-US" smtClean="0"/>
-              <a:t>1/27/2019</a:t>
+              <a:t>2/2/2019</a:t>
             </a:fld>
             <a:endParaRPr lang="en-US"/>
           </a:p>
@@ -2669,7 +2670,7 @@
           <a:p>
             <a:fld id="{9844EE4B-68D4-4DD6-916E-B6BD3677EE44}" type="datetimeFigureOut">
               <a:rPr lang="en-US" smtClean="0"/>
-              <a:t>1/27/2019</a:t>
+              <a:t>2/2/2019</a:t>
             </a:fld>
             <a:endParaRPr lang="en-US"/>
           </a:p>
@@ -2910,7 +2911,7 @@
           <a:p>
             <a:fld id="{9844EE4B-68D4-4DD6-916E-B6BD3677EE44}" type="datetimeFigureOut">
               <a:rPr lang="en-US" smtClean="0"/>
-              <a:t>1/27/2019</a:t>
+              <a:t>2/2/2019</a:t>
             </a:fld>
             <a:endParaRPr lang="en-US"/>
           </a:p>
@@ -3755,7 +3756,7 @@
                     <a:srgbClr val="FF0000"/>
                   </a:solidFill>
                 </a:rPr>
-                <a:t>Cell</a:t>
+                <a:t>Active Cell</a:t>
               </a:r>
             </a:p>
           </p:txBody>
@@ -3827,6 +3828,742 @@
 </file>
 
 <file path=ppt/slides/slide2.xml><?xml version="1.0" encoding="utf-8"?>
+<p:sld xmlns:a="http://schemas.openxmlformats.org/drawingml/2006/main" xmlns:r="http://schemas.openxmlformats.org/officeDocument/2006/relationships" xmlns:p="http://schemas.openxmlformats.org/presentationml/2006/main">
+  <p:cSld>
+    <p:spTree>
+      <p:nvGrpSpPr>
+        <p:cNvPr id="1" name=""/>
+        <p:cNvGrpSpPr/>
+        <p:nvPr/>
+      </p:nvGrpSpPr>
+      <p:grpSpPr>
+        <a:xfrm>
+          <a:off x="0" y="0"/>
+          <a:ext cx="0" cy="0"/>
+          <a:chOff x="0" y="0"/>
+          <a:chExt cx="0" cy="0"/>
+        </a:xfrm>
+      </p:grpSpPr>
+      <p:grpSp>
+        <p:nvGrpSpPr>
+          <p:cNvPr id="4" name="Group 3">
+            <a:extLst>
+              <a:ext uri="{FF2B5EF4-FFF2-40B4-BE49-F238E27FC236}">
+                <a16:creationId xmlns:a16="http://schemas.microsoft.com/office/drawing/2014/main" id="{48A449F4-1FEA-4E4D-8F7D-A92626CDD22D}"/>
+              </a:ext>
+            </a:extLst>
+          </p:cNvPr>
+          <p:cNvGrpSpPr/>
+          <p:nvPr/>
+        </p:nvGrpSpPr>
+        <p:grpSpPr>
+          <a:xfrm>
+            <a:off x="0" y="0"/>
+            <a:ext cx="7278116" cy="3326087"/>
+            <a:chOff x="0" y="0"/>
+            <a:chExt cx="7278116" cy="3326087"/>
+          </a:xfrm>
+        </p:grpSpPr>
+        <p:pic>
+          <p:nvPicPr>
+            <p:cNvPr id="3" name="Picture 2">
+              <a:extLst>
+                <a:ext uri="{FF2B5EF4-FFF2-40B4-BE49-F238E27FC236}">
+                  <a16:creationId xmlns:a16="http://schemas.microsoft.com/office/drawing/2014/main" id="{1CACBE6D-1558-43FF-8CEA-827A181C0C04}"/>
+                </a:ext>
+              </a:extLst>
+            </p:cNvPr>
+            <p:cNvPicPr>
+              <a:picLocks noChangeAspect="1"/>
+            </p:cNvPicPr>
+            <p:nvPr/>
+          </p:nvPicPr>
+          <p:blipFill>
+            <a:blip r:embed="rId2">
+              <a:extLst>
+                <a:ext uri="{28A0092B-C50C-407E-A947-70E740481C1C}">
+                  <a14:useLocalDpi xmlns:a14="http://schemas.microsoft.com/office/drawing/2010/main" val="0"/>
+                </a:ext>
+              </a:extLst>
+            </a:blip>
+            <a:stretch>
+              <a:fillRect/>
+            </a:stretch>
+          </p:blipFill>
+          <p:spPr>
+            <a:xfrm>
+              <a:off x="0" y="0"/>
+              <a:ext cx="7278116" cy="3286584"/>
+            </a:xfrm>
+            <a:prstGeom prst="rect">
+              <a:avLst/>
+            </a:prstGeom>
+          </p:spPr>
+        </p:pic>
+        <p:grpSp>
+          <p:nvGrpSpPr>
+            <p:cNvPr id="8" name="Group 7">
+              <a:extLst>
+                <a:ext uri="{FF2B5EF4-FFF2-40B4-BE49-F238E27FC236}">
+                  <a16:creationId xmlns:a16="http://schemas.microsoft.com/office/drawing/2014/main" id="{EE624E7F-55E2-4EBC-815A-235F39EFC541}"/>
+                </a:ext>
+              </a:extLst>
+            </p:cNvPr>
+            <p:cNvGrpSpPr/>
+            <p:nvPr/>
+          </p:nvGrpSpPr>
+          <p:grpSpPr>
+            <a:xfrm>
+              <a:off x="2664542" y="0"/>
+              <a:ext cx="2674374" cy="338554"/>
+              <a:chOff x="2664542" y="0"/>
+              <a:chExt cx="2674374" cy="338554"/>
+            </a:xfrm>
+          </p:grpSpPr>
+          <p:sp>
+            <p:nvSpPr>
+              <p:cNvPr id="6" name="Arrow: Left 5">
+                <a:extLst>
+                  <a:ext uri="{FF2B5EF4-FFF2-40B4-BE49-F238E27FC236}">
+                    <a16:creationId xmlns:a16="http://schemas.microsoft.com/office/drawing/2014/main" id="{180235C8-668B-4966-91B2-0D1C8B45161B}"/>
+                  </a:ext>
+                </a:extLst>
+              </p:cNvPr>
+              <p:cNvSpPr/>
+              <p:nvPr/>
+            </p:nvSpPr>
+            <p:spPr>
+              <a:xfrm>
+                <a:off x="2664542" y="68826"/>
+                <a:ext cx="383458" cy="196645"/>
+              </a:xfrm>
+              <a:prstGeom prst="leftArrow">
+                <a:avLst/>
+              </a:prstGeom>
+              <a:solidFill>
+                <a:srgbClr val="FF0000"/>
+              </a:solidFill>
+              <a:ln>
+                <a:noFill/>
+              </a:ln>
+            </p:spPr>
+            <p:style>
+              <a:lnRef idx="2">
+                <a:schemeClr val="accent1">
+                  <a:shade val="50000"/>
+                </a:schemeClr>
+              </a:lnRef>
+              <a:fillRef idx="1">
+                <a:schemeClr val="accent1"/>
+              </a:fillRef>
+              <a:effectRef idx="0">
+                <a:schemeClr val="accent1"/>
+              </a:effectRef>
+              <a:fontRef idx="minor">
+                <a:schemeClr val="lt1"/>
+              </a:fontRef>
+            </p:style>
+            <p:txBody>
+              <a:bodyPr rtlCol="0" anchor="ctr"/>
+              <a:lstStyle/>
+              <a:p>
+                <a:pPr algn="ctr"/>
+                <a:endParaRPr lang="en-US"/>
+              </a:p>
+            </p:txBody>
+          </p:sp>
+          <p:sp>
+            <p:nvSpPr>
+              <p:cNvPr id="7" name="TextBox 6">
+                <a:extLst>
+                  <a:ext uri="{FF2B5EF4-FFF2-40B4-BE49-F238E27FC236}">
+                    <a16:creationId xmlns:a16="http://schemas.microsoft.com/office/drawing/2014/main" id="{0017F46F-B7F7-426C-BDCB-B652131F13DD}"/>
+                  </a:ext>
+                </a:extLst>
+              </p:cNvPr>
+              <p:cNvSpPr txBox="1"/>
+              <p:nvPr/>
+            </p:nvSpPr>
+            <p:spPr>
+              <a:xfrm>
+                <a:off x="3028335" y="0"/>
+                <a:ext cx="2310581" cy="338554"/>
+              </a:xfrm>
+              <a:prstGeom prst="rect">
+                <a:avLst/>
+              </a:prstGeom>
+              <a:solidFill>
+                <a:schemeClr val="bg1"/>
+              </a:solidFill>
+            </p:spPr>
+            <p:txBody>
+              <a:bodyPr wrap="square" rtlCol="0">
+                <a:spAutoFit/>
+              </a:bodyPr>
+              <a:lstStyle/>
+              <a:p>
+                <a:r>
+                  <a:rPr lang="en-US" sz="1600" b="1" dirty="0">
+                    <a:solidFill>
+                      <a:srgbClr val="FF0000"/>
+                    </a:solidFill>
+                    <a:effectLst>
+                      <a:outerShdw blurRad="50800" dist="38100" dir="2700000" algn="tl" rotWithShape="0">
+                        <a:schemeClr val="bg1">
+                          <a:alpha val="40000"/>
+                        </a:schemeClr>
+                      </a:outerShdw>
+                    </a:effectLst>
+                  </a:rPr>
+                  <a:t>Notebook name</a:t>
+                </a:r>
+              </a:p>
+            </p:txBody>
+          </p:sp>
+        </p:grpSp>
+        <p:grpSp>
+          <p:nvGrpSpPr>
+            <p:cNvPr id="9" name="Group 8">
+              <a:extLst>
+                <a:ext uri="{FF2B5EF4-FFF2-40B4-BE49-F238E27FC236}">
+                  <a16:creationId xmlns:a16="http://schemas.microsoft.com/office/drawing/2014/main" id="{18A1A939-B48F-41F6-977F-060B5E14416E}"/>
+                </a:ext>
+              </a:extLst>
+            </p:cNvPr>
+            <p:cNvGrpSpPr/>
+            <p:nvPr/>
+          </p:nvGrpSpPr>
+          <p:grpSpPr>
+            <a:xfrm>
+              <a:off x="4673010" y="378544"/>
+              <a:ext cx="1981194" cy="338554"/>
+              <a:chOff x="2664542" y="0"/>
+              <a:chExt cx="1981194" cy="338554"/>
+            </a:xfrm>
+          </p:grpSpPr>
+          <p:sp>
+            <p:nvSpPr>
+              <p:cNvPr id="10" name="Arrow: Left 9">
+                <a:extLst>
+                  <a:ext uri="{FF2B5EF4-FFF2-40B4-BE49-F238E27FC236}">
+                    <a16:creationId xmlns:a16="http://schemas.microsoft.com/office/drawing/2014/main" id="{9B1FA6E4-36D7-4DBE-87B4-EC69989448BE}"/>
+                  </a:ext>
+                </a:extLst>
+              </p:cNvPr>
+              <p:cNvSpPr/>
+              <p:nvPr/>
+            </p:nvSpPr>
+            <p:spPr>
+              <a:xfrm>
+                <a:off x="2664542" y="68826"/>
+                <a:ext cx="383458" cy="196645"/>
+              </a:xfrm>
+              <a:prstGeom prst="leftArrow">
+                <a:avLst/>
+              </a:prstGeom>
+              <a:solidFill>
+                <a:srgbClr val="FF0000"/>
+              </a:solidFill>
+              <a:ln>
+                <a:noFill/>
+              </a:ln>
+            </p:spPr>
+            <p:style>
+              <a:lnRef idx="2">
+                <a:schemeClr val="accent1">
+                  <a:shade val="50000"/>
+                </a:schemeClr>
+              </a:lnRef>
+              <a:fillRef idx="1">
+                <a:schemeClr val="accent1"/>
+              </a:fillRef>
+              <a:effectRef idx="0">
+                <a:schemeClr val="accent1"/>
+              </a:effectRef>
+              <a:fontRef idx="minor">
+                <a:schemeClr val="lt1"/>
+              </a:fontRef>
+            </p:style>
+            <p:txBody>
+              <a:bodyPr rtlCol="0" anchor="ctr"/>
+              <a:lstStyle/>
+              <a:p>
+                <a:pPr algn="ctr"/>
+                <a:endParaRPr lang="en-US">
+                  <a:effectLst>
+                    <a:outerShdw blurRad="38100" dist="38100" dir="2700000" algn="tl">
+                      <a:schemeClr val="bg1">
+                        <a:alpha val="43000"/>
+                      </a:schemeClr>
+                    </a:outerShdw>
+                  </a:effectLst>
+                </a:endParaRPr>
+              </a:p>
+            </p:txBody>
+          </p:sp>
+          <p:sp>
+            <p:nvSpPr>
+              <p:cNvPr id="11" name="TextBox 10">
+                <a:extLst>
+                  <a:ext uri="{FF2B5EF4-FFF2-40B4-BE49-F238E27FC236}">
+                    <a16:creationId xmlns:a16="http://schemas.microsoft.com/office/drawing/2014/main" id="{27457005-371C-4AB8-8FB0-46724104C7CF}"/>
+                  </a:ext>
+                </a:extLst>
+              </p:cNvPr>
+              <p:cNvSpPr txBox="1"/>
+              <p:nvPr/>
+            </p:nvSpPr>
+            <p:spPr>
+              <a:xfrm>
+                <a:off x="3028335" y="0"/>
+                <a:ext cx="1617401" cy="338554"/>
+              </a:xfrm>
+              <a:prstGeom prst="rect">
+                <a:avLst/>
+              </a:prstGeom>
+              <a:noFill/>
+            </p:spPr>
+            <p:txBody>
+              <a:bodyPr wrap="square" rtlCol="0">
+                <a:spAutoFit/>
+              </a:bodyPr>
+              <a:lstStyle/>
+              <a:p>
+                <a:r>
+                  <a:rPr lang="en-US" sz="1600" b="1" dirty="0">
+                    <a:solidFill>
+                      <a:srgbClr val="FF0000"/>
+                    </a:solidFill>
+                    <a:effectLst>
+                      <a:outerShdw blurRad="38100" dist="38100" dir="2700000" algn="tl">
+                        <a:schemeClr val="bg1">
+                          <a:alpha val="43000"/>
+                        </a:schemeClr>
+                      </a:outerShdw>
+                    </a:effectLst>
+                  </a:rPr>
+                  <a:t>Menu bar</a:t>
+                </a:r>
+              </a:p>
+            </p:txBody>
+          </p:sp>
+        </p:grpSp>
+        <p:grpSp>
+          <p:nvGrpSpPr>
+            <p:cNvPr id="12" name="Group 11">
+              <a:extLst>
+                <a:ext uri="{FF2B5EF4-FFF2-40B4-BE49-F238E27FC236}">
+                  <a16:creationId xmlns:a16="http://schemas.microsoft.com/office/drawing/2014/main" id="{5CADF416-F2C4-41A8-A0A0-9BDCA1B21442}"/>
+                </a:ext>
+              </a:extLst>
+            </p:cNvPr>
+            <p:cNvGrpSpPr/>
+            <p:nvPr/>
+          </p:nvGrpSpPr>
+          <p:grpSpPr>
+            <a:xfrm>
+              <a:off x="4689995" y="693175"/>
+              <a:ext cx="2084431" cy="338554"/>
+              <a:chOff x="2664542" y="15120"/>
+              <a:chExt cx="2084431" cy="299423"/>
+            </a:xfrm>
+          </p:grpSpPr>
+          <p:sp>
+            <p:nvSpPr>
+              <p:cNvPr id="13" name="Arrow: Left 12">
+                <a:extLst>
+                  <a:ext uri="{FF2B5EF4-FFF2-40B4-BE49-F238E27FC236}">
+                    <a16:creationId xmlns:a16="http://schemas.microsoft.com/office/drawing/2014/main" id="{D6F4AF31-BC40-4DF3-98A2-F35B8FB1BB1C}"/>
+                  </a:ext>
+                </a:extLst>
+              </p:cNvPr>
+              <p:cNvSpPr/>
+              <p:nvPr/>
+            </p:nvSpPr>
+            <p:spPr>
+              <a:xfrm>
+                <a:off x="2664542" y="68826"/>
+                <a:ext cx="383458" cy="196645"/>
+              </a:xfrm>
+              <a:prstGeom prst="leftArrow">
+                <a:avLst/>
+              </a:prstGeom>
+              <a:solidFill>
+                <a:srgbClr val="FF0000"/>
+              </a:solidFill>
+              <a:ln>
+                <a:noFill/>
+              </a:ln>
+            </p:spPr>
+            <p:style>
+              <a:lnRef idx="2">
+                <a:schemeClr val="accent1">
+                  <a:shade val="50000"/>
+                </a:schemeClr>
+              </a:lnRef>
+              <a:fillRef idx="1">
+                <a:schemeClr val="accent1"/>
+              </a:fillRef>
+              <a:effectRef idx="0">
+                <a:schemeClr val="accent1"/>
+              </a:effectRef>
+              <a:fontRef idx="minor">
+                <a:schemeClr val="lt1"/>
+              </a:fontRef>
+            </p:style>
+            <p:txBody>
+              <a:bodyPr rtlCol="0" anchor="ctr"/>
+              <a:lstStyle/>
+              <a:p>
+                <a:pPr algn="ctr"/>
+                <a:endParaRPr lang="en-US"/>
+              </a:p>
+            </p:txBody>
+          </p:sp>
+          <p:sp>
+            <p:nvSpPr>
+              <p:cNvPr id="14" name="TextBox 13">
+                <a:extLst>
+                  <a:ext uri="{FF2B5EF4-FFF2-40B4-BE49-F238E27FC236}">
+                    <a16:creationId xmlns:a16="http://schemas.microsoft.com/office/drawing/2014/main" id="{FAEC1A4A-C4F3-48A8-8313-C8A21E291150}"/>
+                  </a:ext>
+                </a:extLst>
+              </p:cNvPr>
+              <p:cNvSpPr txBox="1"/>
+              <p:nvPr/>
+            </p:nvSpPr>
+            <p:spPr>
+              <a:xfrm>
+                <a:off x="3028335" y="15120"/>
+                <a:ext cx="1720638" cy="299423"/>
+              </a:xfrm>
+              <a:prstGeom prst="rect">
+                <a:avLst/>
+              </a:prstGeom>
+              <a:solidFill>
+                <a:schemeClr val="bg1"/>
+              </a:solidFill>
+            </p:spPr>
+            <p:txBody>
+              <a:bodyPr wrap="square" rtlCol="0">
+                <a:spAutoFit/>
+              </a:bodyPr>
+              <a:lstStyle/>
+              <a:p>
+                <a:r>
+                  <a:rPr lang="en-US" sz="1600" b="1" dirty="0">
+                    <a:solidFill>
+                      <a:srgbClr val="FF0000"/>
+                    </a:solidFill>
+                    <a:effectLst>
+                      <a:outerShdw blurRad="190500" dir="2700000" algn="tl" rotWithShape="0">
+                        <a:schemeClr val="bg1">
+                          <a:alpha val="40000"/>
+                        </a:schemeClr>
+                      </a:outerShdw>
+                    </a:effectLst>
+                  </a:rPr>
+                  <a:t>Toolbar</a:t>
+                </a:r>
+              </a:p>
+            </p:txBody>
+          </p:sp>
+        </p:grpSp>
+        <p:sp>
+          <p:nvSpPr>
+            <p:cNvPr id="15" name="TextBox 14">
+              <a:extLst>
+                <a:ext uri="{FF2B5EF4-FFF2-40B4-BE49-F238E27FC236}">
+                  <a16:creationId xmlns:a16="http://schemas.microsoft.com/office/drawing/2014/main" id="{5AC6CF5D-295C-45FE-8AF0-4EFA52615545}"/>
+                </a:ext>
+              </a:extLst>
+            </p:cNvPr>
+            <p:cNvSpPr txBox="1"/>
+            <p:nvPr/>
+          </p:nvSpPr>
+          <p:spPr>
+            <a:xfrm>
+              <a:off x="468810" y="2330244"/>
+              <a:ext cx="1617401" cy="338554"/>
+            </a:xfrm>
+            <a:prstGeom prst="rect">
+              <a:avLst/>
+            </a:prstGeom>
+            <a:noFill/>
+          </p:spPr>
+          <p:txBody>
+            <a:bodyPr wrap="square" rtlCol="0">
+              <a:spAutoFit/>
+            </a:bodyPr>
+            <a:lstStyle/>
+            <a:p>
+              <a:r>
+                <a:rPr lang="en-US" sz="1600" b="1" dirty="0">
+                  <a:solidFill>
+                    <a:srgbClr val="FF0000"/>
+                  </a:solidFill>
+                  <a:effectLst>
+                    <a:outerShdw blurRad="38100" dist="38100" dir="2700000" algn="tl">
+                      <a:schemeClr val="bg1">
+                        <a:alpha val="43000"/>
+                      </a:schemeClr>
+                    </a:outerShdw>
+                  </a:effectLst>
+                </a:rPr>
+                <a:t>Active Cell</a:t>
+              </a:r>
+            </a:p>
+          </p:txBody>
+        </p:sp>
+        <p:sp>
+          <p:nvSpPr>
+            <p:cNvPr id="16" name="Right Brace 15">
+              <a:extLst>
+                <a:ext uri="{FF2B5EF4-FFF2-40B4-BE49-F238E27FC236}">
+                  <a16:creationId xmlns:a16="http://schemas.microsoft.com/office/drawing/2014/main" id="{43E562C2-4DA9-4796-9ECD-A6825FB89030}"/>
+                </a:ext>
+              </a:extLst>
+            </p:cNvPr>
+            <p:cNvSpPr/>
+            <p:nvPr/>
+          </p:nvSpPr>
+          <p:spPr>
+            <a:xfrm>
+              <a:off x="173781" y="2321576"/>
+              <a:ext cx="199845" cy="583821"/>
+            </a:xfrm>
+            <a:prstGeom prst="rightBrace">
+              <a:avLst>
+                <a:gd name="adj1" fmla="val 48040"/>
+                <a:gd name="adj2" fmla="val 31443"/>
+              </a:avLst>
+            </a:prstGeom>
+            <a:ln w="28575">
+              <a:solidFill>
+                <a:srgbClr val="FF0000"/>
+              </a:solidFill>
+            </a:ln>
+          </p:spPr>
+          <p:style>
+            <a:lnRef idx="1">
+              <a:schemeClr val="accent1"/>
+            </a:lnRef>
+            <a:fillRef idx="0">
+              <a:schemeClr val="accent1"/>
+            </a:fillRef>
+            <a:effectRef idx="0">
+              <a:schemeClr val="accent1"/>
+            </a:effectRef>
+            <a:fontRef idx="minor">
+              <a:schemeClr val="tx1"/>
+            </a:fontRef>
+          </p:style>
+          <p:txBody>
+            <a:bodyPr rtlCol="0" anchor="ctr"/>
+            <a:lstStyle/>
+            <a:p>
+              <a:pPr algn="ctr"/>
+              <a:endParaRPr lang="en-US"/>
+            </a:p>
+          </p:txBody>
+        </p:sp>
+        <p:sp>
+          <p:nvSpPr>
+            <p:cNvPr id="18" name="Right Brace 17">
+              <a:extLst>
+                <a:ext uri="{FF2B5EF4-FFF2-40B4-BE49-F238E27FC236}">
+                  <a16:creationId xmlns:a16="http://schemas.microsoft.com/office/drawing/2014/main" id="{0F1342E1-59F4-4584-874D-54E3F0929095}"/>
+                </a:ext>
+              </a:extLst>
+            </p:cNvPr>
+            <p:cNvSpPr/>
+            <p:nvPr/>
+          </p:nvSpPr>
+          <p:spPr>
+            <a:xfrm>
+              <a:off x="173781" y="1425771"/>
+              <a:ext cx="199845" cy="856303"/>
+            </a:xfrm>
+            <a:prstGeom prst="rightBrace">
+              <a:avLst>
+                <a:gd name="adj1" fmla="val 48040"/>
+                <a:gd name="adj2" fmla="val 44095"/>
+              </a:avLst>
+            </a:prstGeom>
+            <a:ln w="28575">
+              <a:solidFill>
+                <a:srgbClr val="FF0000"/>
+              </a:solidFill>
+            </a:ln>
+          </p:spPr>
+          <p:style>
+            <a:lnRef idx="1">
+              <a:schemeClr val="accent1"/>
+            </a:lnRef>
+            <a:fillRef idx="0">
+              <a:schemeClr val="accent1"/>
+            </a:fillRef>
+            <a:effectRef idx="0">
+              <a:schemeClr val="accent1"/>
+            </a:effectRef>
+            <a:fontRef idx="minor">
+              <a:schemeClr val="tx1"/>
+            </a:fontRef>
+          </p:style>
+          <p:txBody>
+            <a:bodyPr rtlCol="0" anchor="ctr"/>
+            <a:lstStyle/>
+            <a:p>
+              <a:pPr algn="ctr"/>
+              <a:endParaRPr lang="en-US"/>
+            </a:p>
+          </p:txBody>
+        </p:sp>
+        <p:sp>
+          <p:nvSpPr>
+            <p:cNvPr id="19" name="TextBox 18">
+              <a:extLst>
+                <a:ext uri="{FF2B5EF4-FFF2-40B4-BE49-F238E27FC236}">
+                  <a16:creationId xmlns:a16="http://schemas.microsoft.com/office/drawing/2014/main" id="{2F6A9D1F-B8E5-47CB-B7F6-DEE67240AE39}"/>
+                </a:ext>
+              </a:extLst>
+            </p:cNvPr>
+            <p:cNvSpPr txBox="1"/>
+            <p:nvPr/>
+          </p:nvSpPr>
+          <p:spPr>
+            <a:xfrm>
+              <a:off x="468809" y="1621622"/>
+              <a:ext cx="1617401" cy="338554"/>
+            </a:xfrm>
+            <a:prstGeom prst="rect">
+              <a:avLst/>
+            </a:prstGeom>
+            <a:noFill/>
+          </p:spPr>
+          <p:txBody>
+            <a:bodyPr wrap="square" rtlCol="0">
+              <a:spAutoFit/>
+            </a:bodyPr>
+            <a:lstStyle/>
+            <a:p>
+              <a:r>
+                <a:rPr lang="en-US" sz="1600" b="1" dirty="0">
+                  <a:solidFill>
+                    <a:srgbClr val="FF0000"/>
+                  </a:solidFill>
+                </a:rPr>
+                <a:t>Cell</a:t>
+              </a:r>
+            </a:p>
+          </p:txBody>
+        </p:sp>
+        <p:sp>
+          <p:nvSpPr>
+            <p:cNvPr id="20" name="Right Brace 19">
+              <a:extLst>
+                <a:ext uri="{FF2B5EF4-FFF2-40B4-BE49-F238E27FC236}">
+                  <a16:creationId xmlns:a16="http://schemas.microsoft.com/office/drawing/2014/main" id="{779B7D59-DCF5-4F63-ADF0-6154F735EE73}"/>
+                </a:ext>
+              </a:extLst>
+            </p:cNvPr>
+            <p:cNvSpPr/>
+            <p:nvPr/>
+          </p:nvSpPr>
+          <p:spPr>
+            <a:xfrm>
+              <a:off x="173781" y="2937889"/>
+              <a:ext cx="199845" cy="388198"/>
+            </a:xfrm>
+            <a:prstGeom prst="rightBrace">
+              <a:avLst>
+                <a:gd name="adj1" fmla="val 48040"/>
+                <a:gd name="adj2" fmla="val 44095"/>
+              </a:avLst>
+            </a:prstGeom>
+            <a:ln w="28575">
+              <a:solidFill>
+                <a:srgbClr val="FF0000"/>
+              </a:solidFill>
+            </a:ln>
+          </p:spPr>
+          <p:style>
+            <a:lnRef idx="1">
+              <a:schemeClr val="accent1"/>
+            </a:lnRef>
+            <a:fillRef idx="0">
+              <a:schemeClr val="accent1"/>
+            </a:fillRef>
+            <a:effectRef idx="0">
+              <a:schemeClr val="accent1"/>
+            </a:effectRef>
+            <a:fontRef idx="minor">
+              <a:schemeClr val="tx1"/>
+            </a:fontRef>
+          </p:style>
+          <p:txBody>
+            <a:bodyPr rtlCol="0" anchor="ctr"/>
+            <a:lstStyle/>
+            <a:p>
+              <a:pPr algn="ctr"/>
+              <a:endParaRPr lang="en-US"/>
+            </a:p>
+          </p:txBody>
+        </p:sp>
+        <p:sp>
+          <p:nvSpPr>
+            <p:cNvPr id="21" name="TextBox 20">
+              <a:extLst>
+                <a:ext uri="{FF2B5EF4-FFF2-40B4-BE49-F238E27FC236}">
+                  <a16:creationId xmlns:a16="http://schemas.microsoft.com/office/drawing/2014/main" id="{CBA79CED-AE49-4E37-8D62-A7062486214B}"/>
+                </a:ext>
+              </a:extLst>
+            </p:cNvPr>
+            <p:cNvSpPr txBox="1"/>
+            <p:nvPr/>
+          </p:nvSpPr>
+          <p:spPr>
+            <a:xfrm>
+              <a:off x="468809" y="2937889"/>
+              <a:ext cx="1617401" cy="338554"/>
+            </a:xfrm>
+            <a:prstGeom prst="rect">
+              <a:avLst/>
+            </a:prstGeom>
+            <a:noFill/>
+          </p:spPr>
+          <p:txBody>
+            <a:bodyPr wrap="square" rtlCol="0">
+              <a:spAutoFit/>
+            </a:bodyPr>
+            <a:lstStyle/>
+            <a:p>
+              <a:r>
+                <a:rPr lang="en-US" sz="1600" b="1" dirty="0">
+                  <a:solidFill>
+                    <a:srgbClr val="FF0000"/>
+                  </a:solidFill>
+                </a:rPr>
+                <a:t>Cell</a:t>
+              </a:r>
+            </a:p>
+          </p:txBody>
+        </p:sp>
+      </p:grpSp>
+    </p:spTree>
+    <p:extLst>
+      <p:ext uri="{BB962C8B-B14F-4D97-AF65-F5344CB8AC3E}">
+        <p14:creationId xmlns:p14="http://schemas.microsoft.com/office/powerpoint/2010/main" val="16768852"/>
+      </p:ext>
+    </p:extLst>
+  </p:cSld>
+  <p:clrMapOvr>
+    <a:masterClrMapping/>
+  </p:clrMapOvr>
+</p:sld>
+</file>
+
+<file path=ppt/slides/slide3.xml><?xml version="1.0" encoding="utf-8"?>
 <p:sld xmlns:a="http://schemas.openxmlformats.org/drawingml/2006/main" xmlns:r="http://schemas.openxmlformats.org/officeDocument/2006/relationships" xmlns:p="http://schemas.openxmlformats.org/presentationml/2006/main">
   <p:cSld>
     <p:spTree>

</xml_diff>

<commit_message>
added terminology figure to 005
</commit_message>
<xml_diff>
--- a/images/resources/resources.pptx
+++ b/images/resources/resources.pptx
@@ -7,7 +7,8 @@
   <p:sldIdLst>
     <p:sldId id="256" r:id="rId2"/>
     <p:sldId id="258" r:id="rId3"/>
-    <p:sldId id="257" r:id="rId4"/>
+    <p:sldId id="259" r:id="rId4"/>
+    <p:sldId id="257" r:id="rId5"/>
   </p:sldIdLst>
   <p:sldSz cx="12192000" cy="6858000"/>
   <p:notesSz cx="6858000" cy="9144000"/>
@@ -261,7 +262,7 @@
           <a:p>
             <a:fld id="{9844EE4B-68D4-4DD6-916E-B6BD3677EE44}" type="datetimeFigureOut">
               <a:rPr lang="en-US" smtClean="0"/>
-              <a:t>2/2/2019</a:t>
+              <a:t>3/2/2019</a:t>
             </a:fld>
             <a:endParaRPr lang="en-US"/>
           </a:p>
@@ -459,7 +460,7 @@
           <a:p>
             <a:fld id="{9844EE4B-68D4-4DD6-916E-B6BD3677EE44}" type="datetimeFigureOut">
               <a:rPr lang="en-US" smtClean="0"/>
-              <a:t>2/2/2019</a:t>
+              <a:t>3/2/2019</a:t>
             </a:fld>
             <a:endParaRPr lang="en-US"/>
           </a:p>
@@ -667,7 +668,7 @@
           <a:p>
             <a:fld id="{9844EE4B-68D4-4DD6-916E-B6BD3677EE44}" type="datetimeFigureOut">
               <a:rPr lang="en-US" smtClean="0"/>
-              <a:t>2/2/2019</a:t>
+              <a:t>3/2/2019</a:t>
             </a:fld>
             <a:endParaRPr lang="en-US"/>
           </a:p>
@@ -865,7 +866,7 @@
           <a:p>
             <a:fld id="{9844EE4B-68D4-4DD6-916E-B6BD3677EE44}" type="datetimeFigureOut">
               <a:rPr lang="en-US" smtClean="0"/>
-              <a:t>2/2/2019</a:t>
+              <a:t>3/2/2019</a:t>
             </a:fld>
             <a:endParaRPr lang="en-US"/>
           </a:p>
@@ -1140,7 +1141,7 @@
           <a:p>
             <a:fld id="{9844EE4B-68D4-4DD6-916E-B6BD3677EE44}" type="datetimeFigureOut">
               <a:rPr lang="en-US" smtClean="0"/>
-              <a:t>2/2/2019</a:t>
+              <a:t>3/2/2019</a:t>
             </a:fld>
             <a:endParaRPr lang="en-US"/>
           </a:p>
@@ -1405,7 +1406,7 @@
           <a:p>
             <a:fld id="{9844EE4B-68D4-4DD6-916E-B6BD3677EE44}" type="datetimeFigureOut">
               <a:rPr lang="en-US" smtClean="0"/>
-              <a:t>2/2/2019</a:t>
+              <a:t>3/2/2019</a:t>
             </a:fld>
             <a:endParaRPr lang="en-US"/>
           </a:p>
@@ -1817,7 +1818,7 @@
           <a:p>
             <a:fld id="{9844EE4B-68D4-4DD6-916E-B6BD3677EE44}" type="datetimeFigureOut">
               <a:rPr lang="en-US" smtClean="0"/>
-              <a:t>2/2/2019</a:t>
+              <a:t>3/2/2019</a:t>
             </a:fld>
             <a:endParaRPr lang="en-US"/>
           </a:p>
@@ -1958,7 +1959,7 @@
           <a:p>
             <a:fld id="{9844EE4B-68D4-4DD6-916E-B6BD3677EE44}" type="datetimeFigureOut">
               <a:rPr lang="en-US" smtClean="0"/>
-              <a:t>2/2/2019</a:t>
+              <a:t>3/2/2019</a:t>
             </a:fld>
             <a:endParaRPr lang="en-US"/>
           </a:p>
@@ -2071,7 +2072,7 @@
           <a:p>
             <a:fld id="{9844EE4B-68D4-4DD6-916E-B6BD3677EE44}" type="datetimeFigureOut">
               <a:rPr lang="en-US" smtClean="0"/>
-              <a:t>2/2/2019</a:t>
+              <a:t>3/2/2019</a:t>
             </a:fld>
             <a:endParaRPr lang="en-US"/>
           </a:p>
@@ -2382,7 +2383,7 @@
           <a:p>
             <a:fld id="{9844EE4B-68D4-4DD6-916E-B6BD3677EE44}" type="datetimeFigureOut">
               <a:rPr lang="en-US" smtClean="0"/>
-              <a:t>2/2/2019</a:t>
+              <a:t>3/2/2019</a:t>
             </a:fld>
             <a:endParaRPr lang="en-US"/>
           </a:p>
@@ -2670,7 +2671,7 @@
           <a:p>
             <a:fld id="{9844EE4B-68D4-4DD6-916E-B6BD3677EE44}" type="datetimeFigureOut">
               <a:rPr lang="en-US" smtClean="0"/>
-              <a:t>2/2/2019</a:t>
+              <a:t>3/2/2019</a:t>
             </a:fld>
             <a:endParaRPr lang="en-US"/>
           </a:p>
@@ -2911,7 +2912,7 @@
           <a:p>
             <a:fld id="{9844EE4B-68D4-4DD6-916E-B6BD3677EE44}" type="datetimeFigureOut">
               <a:rPr lang="en-US" smtClean="0"/>
-              <a:t>2/2/2019</a:t>
+              <a:t>3/2/2019</a:t>
             </a:fld>
             <a:endParaRPr lang="en-US"/>
           </a:p>
@@ -4580,6 +4581,1035 @@
           <a:chExt cx="0" cy="0"/>
         </a:xfrm>
       </p:grpSpPr>
+      <p:grpSp>
+        <p:nvGrpSpPr>
+          <p:cNvPr id="80" name="Group 79">
+            <a:extLst>
+              <a:ext uri="{FF2B5EF4-FFF2-40B4-BE49-F238E27FC236}">
+                <a16:creationId xmlns:a16="http://schemas.microsoft.com/office/drawing/2014/main" id="{611C75FF-1E9C-44CC-A387-0A9F8758229F}"/>
+              </a:ext>
+            </a:extLst>
+          </p:cNvPr>
+          <p:cNvGrpSpPr/>
+          <p:nvPr/>
+        </p:nvGrpSpPr>
+        <p:grpSpPr>
+          <a:xfrm>
+            <a:off x="878610" y="454335"/>
+            <a:ext cx="6947335" cy="3227409"/>
+            <a:chOff x="878610" y="454335"/>
+            <a:chExt cx="6947335" cy="3227409"/>
+          </a:xfrm>
+        </p:grpSpPr>
+        <p:pic>
+          <p:nvPicPr>
+            <p:cNvPr id="5" name="Picture 4">
+              <a:extLst>
+                <a:ext uri="{FF2B5EF4-FFF2-40B4-BE49-F238E27FC236}">
+                  <a16:creationId xmlns:a16="http://schemas.microsoft.com/office/drawing/2014/main" id="{E129BEA9-A2DA-46EA-A83B-B94A33FCBFA8}"/>
+                </a:ext>
+              </a:extLst>
+            </p:cNvPr>
+            <p:cNvPicPr>
+              <a:picLocks noChangeAspect="1"/>
+            </p:cNvPicPr>
+            <p:nvPr/>
+          </p:nvPicPr>
+          <p:blipFill rotWithShape="1">
+            <a:blip r:embed="rId2">
+              <a:extLst>
+                <a:ext uri="{28A0092B-C50C-407E-A947-70E740481C1C}">
+                  <a14:useLocalDpi xmlns:a14="http://schemas.microsoft.com/office/drawing/2010/main" val="0"/>
+                </a:ext>
+              </a:extLst>
+            </a:blip>
+            <a:srcRect l="21086" t="7261" r="20809" b="4144"/>
+            <a:stretch/>
+          </p:blipFill>
+          <p:spPr>
+            <a:xfrm>
+              <a:off x="3130379" y="1359244"/>
+              <a:ext cx="2800865" cy="1721708"/>
+            </a:xfrm>
+            <a:prstGeom prst="rect">
+              <a:avLst/>
+            </a:prstGeom>
+            <a:ln>
+              <a:solidFill>
+                <a:schemeClr val="accent1"/>
+              </a:solidFill>
+            </a:ln>
+          </p:spPr>
+        </p:pic>
+        <p:sp>
+          <p:nvSpPr>
+            <p:cNvPr id="17" name="Rectangle: Rounded Corners 16">
+              <a:extLst>
+                <a:ext uri="{FF2B5EF4-FFF2-40B4-BE49-F238E27FC236}">
+                  <a16:creationId xmlns:a16="http://schemas.microsoft.com/office/drawing/2014/main" id="{871BE0E6-886E-4531-B440-F86685B158DA}"/>
+                </a:ext>
+              </a:extLst>
+            </p:cNvPr>
+            <p:cNvSpPr/>
+            <p:nvPr/>
+          </p:nvSpPr>
+          <p:spPr>
+            <a:xfrm>
+              <a:off x="3130379" y="1359244"/>
+              <a:ext cx="1737360" cy="650788"/>
+            </a:xfrm>
+            <a:prstGeom prst="roundRect">
+              <a:avLst/>
+            </a:prstGeom>
+            <a:noFill/>
+            <a:ln w="19050">
+              <a:solidFill>
+                <a:srgbClr val="FF0000"/>
+              </a:solidFill>
+              <a:prstDash val="sysDot"/>
+            </a:ln>
+          </p:spPr>
+          <p:style>
+            <a:lnRef idx="2">
+              <a:schemeClr val="accent1">
+                <a:shade val="50000"/>
+              </a:schemeClr>
+            </a:lnRef>
+            <a:fillRef idx="1">
+              <a:schemeClr val="accent1"/>
+            </a:fillRef>
+            <a:effectRef idx="0">
+              <a:schemeClr val="accent1"/>
+            </a:effectRef>
+            <a:fontRef idx="minor">
+              <a:schemeClr val="lt1"/>
+            </a:fontRef>
+          </p:style>
+          <p:txBody>
+            <a:bodyPr rtlCol="0" anchor="ctr"/>
+            <a:lstStyle/>
+            <a:p>
+              <a:pPr algn="ctr"/>
+              <a:endParaRPr lang="en-US"/>
+            </a:p>
+          </p:txBody>
+        </p:sp>
+        <p:sp>
+          <p:nvSpPr>
+            <p:cNvPr id="24" name="TextBox 23">
+              <a:extLst>
+                <a:ext uri="{FF2B5EF4-FFF2-40B4-BE49-F238E27FC236}">
+                  <a16:creationId xmlns:a16="http://schemas.microsoft.com/office/drawing/2014/main" id="{16F71893-9633-4CEE-B6B9-91C3A8383785}"/>
+                </a:ext>
+              </a:extLst>
+            </p:cNvPr>
+            <p:cNvSpPr txBox="1"/>
+            <p:nvPr/>
+          </p:nvSpPr>
+          <p:spPr>
+            <a:xfrm>
+              <a:off x="6096000" y="1536011"/>
+              <a:ext cx="1729945" cy="307777"/>
+            </a:xfrm>
+            <a:prstGeom prst="rect">
+              <a:avLst/>
+            </a:prstGeom>
+            <a:noFill/>
+          </p:spPr>
+          <p:txBody>
+            <a:bodyPr wrap="square" rtlCol="0">
+              <a:spAutoFit/>
+            </a:bodyPr>
+            <a:lstStyle/>
+            <a:p>
+              <a:r>
+                <a:rPr lang="en-US" sz="1400" dirty="0">
+                  <a:solidFill>
+                    <a:srgbClr val="FF0000"/>
+                  </a:solidFill>
+                  <a:latin typeface="Comic Sans MS" panose="030F0702030302020204" pitchFamily="66" charset="0"/>
+                </a:rPr>
+                <a:t>function definition</a:t>
+              </a:r>
+            </a:p>
+          </p:txBody>
+        </p:sp>
+        <p:cxnSp>
+          <p:nvCxnSpPr>
+            <p:cNvPr id="26" name="Straight Arrow Connector 25">
+              <a:extLst>
+                <a:ext uri="{FF2B5EF4-FFF2-40B4-BE49-F238E27FC236}">
+                  <a16:creationId xmlns:a16="http://schemas.microsoft.com/office/drawing/2014/main" id="{252343A1-96FC-43A2-8DE7-7AD968CBFBC0}"/>
+                </a:ext>
+              </a:extLst>
+            </p:cNvPr>
+            <p:cNvCxnSpPr>
+              <a:cxnSpLocks/>
+              <a:stCxn id="24" idx="1"/>
+              <a:endCxn id="17" idx="3"/>
+            </p:cNvCxnSpPr>
+            <p:nvPr/>
+          </p:nvCxnSpPr>
+          <p:spPr>
+            <a:xfrm flipH="1" flipV="1">
+              <a:off x="4867739" y="1684638"/>
+              <a:ext cx="1228261" cy="5262"/>
+            </a:xfrm>
+            <a:prstGeom prst="straightConnector1">
+              <a:avLst/>
+            </a:prstGeom>
+            <a:ln w="12700">
+              <a:solidFill>
+                <a:srgbClr val="FF0000"/>
+              </a:solidFill>
+              <a:prstDash val="sysDot"/>
+              <a:tailEnd type="triangle"/>
+            </a:ln>
+          </p:spPr>
+          <p:style>
+            <a:lnRef idx="1">
+              <a:schemeClr val="accent1"/>
+            </a:lnRef>
+            <a:fillRef idx="0">
+              <a:schemeClr val="accent1"/>
+            </a:fillRef>
+            <a:effectRef idx="0">
+              <a:schemeClr val="accent1"/>
+            </a:effectRef>
+            <a:fontRef idx="minor">
+              <a:schemeClr val="tx1"/>
+            </a:fontRef>
+          </p:style>
+        </p:cxnSp>
+        <p:sp>
+          <p:nvSpPr>
+            <p:cNvPr id="27" name="TextBox 26">
+              <a:extLst>
+                <a:ext uri="{FF2B5EF4-FFF2-40B4-BE49-F238E27FC236}">
+                  <a16:creationId xmlns:a16="http://schemas.microsoft.com/office/drawing/2014/main" id="{712BE02B-5766-4589-8BB9-E8A12B67FABB}"/>
+                </a:ext>
+              </a:extLst>
+            </p:cNvPr>
+            <p:cNvSpPr txBox="1"/>
+            <p:nvPr/>
+          </p:nvSpPr>
+          <p:spPr>
+            <a:xfrm>
+              <a:off x="6096000" y="2482219"/>
+              <a:ext cx="1729945" cy="307777"/>
+            </a:xfrm>
+            <a:prstGeom prst="rect">
+              <a:avLst/>
+            </a:prstGeom>
+            <a:noFill/>
+          </p:spPr>
+          <p:txBody>
+            <a:bodyPr wrap="square" rtlCol="0">
+              <a:spAutoFit/>
+            </a:bodyPr>
+            <a:lstStyle/>
+            <a:p>
+              <a:r>
+                <a:rPr lang="en-US" sz="1400" dirty="0">
+                  <a:solidFill>
+                    <a:srgbClr val="FF0000"/>
+                  </a:solidFill>
+                  <a:latin typeface="Comic Sans MS" panose="030F0702030302020204" pitchFamily="66" charset="0"/>
+                </a:rPr>
+                <a:t>function call</a:t>
+              </a:r>
+            </a:p>
+          </p:txBody>
+        </p:sp>
+        <p:sp>
+          <p:nvSpPr>
+            <p:cNvPr id="28" name="Rectangle: Rounded Corners 27">
+              <a:extLst>
+                <a:ext uri="{FF2B5EF4-FFF2-40B4-BE49-F238E27FC236}">
+                  <a16:creationId xmlns:a16="http://schemas.microsoft.com/office/drawing/2014/main" id="{D9B05DA0-23CB-40C9-B56D-3C95209A80D1}"/>
+                </a:ext>
+              </a:extLst>
+            </p:cNvPr>
+            <p:cNvSpPr/>
+            <p:nvPr/>
+          </p:nvSpPr>
+          <p:spPr>
+            <a:xfrm>
+              <a:off x="3810001" y="2486338"/>
+              <a:ext cx="1239794" cy="299539"/>
+            </a:xfrm>
+            <a:prstGeom prst="roundRect">
+              <a:avLst/>
+            </a:prstGeom>
+            <a:noFill/>
+            <a:ln w="19050">
+              <a:solidFill>
+                <a:srgbClr val="FF0000"/>
+              </a:solidFill>
+              <a:prstDash val="sysDot"/>
+            </a:ln>
+          </p:spPr>
+          <p:style>
+            <a:lnRef idx="2">
+              <a:schemeClr val="accent1">
+                <a:shade val="50000"/>
+              </a:schemeClr>
+            </a:lnRef>
+            <a:fillRef idx="1">
+              <a:schemeClr val="accent1"/>
+            </a:fillRef>
+            <a:effectRef idx="0">
+              <a:schemeClr val="accent1"/>
+            </a:effectRef>
+            <a:fontRef idx="minor">
+              <a:schemeClr val="lt1"/>
+            </a:fontRef>
+          </p:style>
+          <p:txBody>
+            <a:bodyPr rtlCol="0" anchor="ctr"/>
+            <a:lstStyle/>
+            <a:p>
+              <a:pPr algn="ctr"/>
+              <a:endParaRPr lang="en-US"/>
+            </a:p>
+          </p:txBody>
+        </p:sp>
+        <p:cxnSp>
+          <p:nvCxnSpPr>
+            <p:cNvPr id="29" name="Straight Arrow Connector 28">
+              <a:extLst>
+                <a:ext uri="{FF2B5EF4-FFF2-40B4-BE49-F238E27FC236}">
+                  <a16:creationId xmlns:a16="http://schemas.microsoft.com/office/drawing/2014/main" id="{2BF8F2E2-D8DF-4691-9E6A-815447B7381C}"/>
+                </a:ext>
+              </a:extLst>
+            </p:cNvPr>
+            <p:cNvCxnSpPr>
+              <a:cxnSpLocks/>
+              <a:stCxn id="27" idx="1"/>
+              <a:endCxn id="28" idx="3"/>
+            </p:cNvCxnSpPr>
+            <p:nvPr/>
+          </p:nvCxnSpPr>
+          <p:spPr>
+            <a:xfrm flipH="1">
+              <a:off x="5049795" y="2636108"/>
+              <a:ext cx="1046205" cy="0"/>
+            </a:xfrm>
+            <a:prstGeom prst="straightConnector1">
+              <a:avLst/>
+            </a:prstGeom>
+            <a:ln w="12700">
+              <a:solidFill>
+                <a:srgbClr val="FF0000"/>
+              </a:solidFill>
+              <a:prstDash val="sysDot"/>
+              <a:tailEnd type="triangle"/>
+            </a:ln>
+          </p:spPr>
+          <p:style>
+            <a:lnRef idx="1">
+              <a:schemeClr val="accent1"/>
+            </a:lnRef>
+            <a:fillRef idx="0">
+              <a:schemeClr val="accent1"/>
+            </a:fillRef>
+            <a:effectRef idx="0">
+              <a:schemeClr val="accent1"/>
+            </a:effectRef>
+            <a:fontRef idx="minor">
+              <a:schemeClr val="tx1"/>
+            </a:fontRef>
+          </p:style>
+        </p:cxnSp>
+        <p:sp>
+          <p:nvSpPr>
+            <p:cNvPr id="32" name="TextBox 31">
+              <a:extLst>
+                <a:ext uri="{FF2B5EF4-FFF2-40B4-BE49-F238E27FC236}">
+                  <a16:creationId xmlns:a16="http://schemas.microsoft.com/office/drawing/2014/main" id="{4301ED2B-810C-4882-BB5A-74D0B94B9669}"/>
+                </a:ext>
+              </a:extLst>
+            </p:cNvPr>
+            <p:cNvSpPr txBox="1"/>
+            <p:nvPr/>
+          </p:nvSpPr>
+          <p:spPr>
+            <a:xfrm>
+              <a:off x="3354859" y="3373967"/>
+              <a:ext cx="2265406" cy="307777"/>
+            </a:xfrm>
+            <a:prstGeom prst="rect">
+              <a:avLst/>
+            </a:prstGeom>
+            <a:noFill/>
+          </p:spPr>
+          <p:txBody>
+            <a:bodyPr wrap="square" rtlCol="0">
+              <a:spAutoFit/>
+            </a:bodyPr>
+            <a:lstStyle/>
+            <a:p>
+              <a:pPr algn="ctr"/>
+              <a:r>
+                <a:rPr lang="en-US" sz="1400" dirty="0">
+                  <a:solidFill>
+                    <a:srgbClr val="FF0000"/>
+                  </a:solidFill>
+                  <a:latin typeface="Comic Sans MS" panose="030F0702030302020204" pitchFamily="66" charset="0"/>
+                </a:rPr>
+                <a:t>function arguments</a:t>
+              </a:r>
+            </a:p>
+          </p:txBody>
+        </p:sp>
+        <p:cxnSp>
+          <p:nvCxnSpPr>
+            <p:cNvPr id="33" name="Straight Arrow Connector 32">
+              <a:extLst>
+                <a:ext uri="{FF2B5EF4-FFF2-40B4-BE49-F238E27FC236}">
+                  <a16:creationId xmlns:a16="http://schemas.microsoft.com/office/drawing/2014/main" id="{11E81CF2-BC3E-4532-8BDF-748ACB624124}"/>
+                </a:ext>
+              </a:extLst>
+            </p:cNvPr>
+            <p:cNvCxnSpPr>
+              <a:cxnSpLocks/>
+              <a:stCxn id="32" idx="0"/>
+            </p:cNvCxnSpPr>
+            <p:nvPr/>
+          </p:nvCxnSpPr>
+          <p:spPr>
+            <a:xfrm flipH="1" flipV="1">
+              <a:off x="4324865" y="2718486"/>
+              <a:ext cx="162697" cy="655481"/>
+            </a:xfrm>
+            <a:prstGeom prst="straightConnector1">
+              <a:avLst/>
+            </a:prstGeom>
+            <a:ln>
+              <a:solidFill>
+                <a:srgbClr val="FF0000"/>
+              </a:solidFill>
+              <a:tailEnd type="triangle"/>
+            </a:ln>
+          </p:spPr>
+          <p:style>
+            <a:lnRef idx="1">
+              <a:schemeClr val="accent1"/>
+            </a:lnRef>
+            <a:fillRef idx="0">
+              <a:schemeClr val="accent1"/>
+            </a:fillRef>
+            <a:effectRef idx="0">
+              <a:schemeClr val="accent1"/>
+            </a:effectRef>
+            <a:fontRef idx="minor">
+              <a:schemeClr val="tx1"/>
+            </a:fontRef>
+          </p:style>
+        </p:cxnSp>
+        <p:cxnSp>
+          <p:nvCxnSpPr>
+            <p:cNvPr id="36" name="Straight Arrow Connector 35">
+              <a:extLst>
+                <a:ext uri="{FF2B5EF4-FFF2-40B4-BE49-F238E27FC236}">
+                  <a16:creationId xmlns:a16="http://schemas.microsoft.com/office/drawing/2014/main" id="{5FF34135-3004-472C-9244-F3C8A2654734}"/>
+                </a:ext>
+              </a:extLst>
+            </p:cNvPr>
+            <p:cNvCxnSpPr>
+              <a:cxnSpLocks/>
+              <a:stCxn id="32" idx="0"/>
+            </p:cNvCxnSpPr>
+            <p:nvPr/>
+          </p:nvCxnSpPr>
+          <p:spPr>
+            <a:xfrm flipV="1">
+              <a:off x="4487562" y="2718486"/>
+              <a:ext cx="306860" cy="655481"/>
+            </a:xfrm>
+            <a:prstGeom prst="straightConnector1">
+              <a:avLst/>
+            </a:prstGeom>
+            <a:ln>
+              <a:solidFill>
+                <a:srgbClr val="FF0000"/>
+              </a:solidFill>
+              <a:tailEnd type="triangle"/>
+            </a:ln>
+          </p:spPr>
+          <p:style>
+            <a:lnRef idx="1">
+              <a:schemeClr val="accent1"/>
+            </a:lnRef>
+            <a:fillRef idx="0">
+              <a:schemeClr val="accent1"/>
+            </a:fillRef>
+            <a:effectRef idx="0">
+              <a:schemeClr val="accent1"/>
+            </a:effectRef>
+            <a:fontRef idx="minor">
+              <a:schemeClr val="tx1"/>
+            </a:fontRef>
+          </p:style>
+        </p:cxnSp>
+        <p:sp>
+          <p:nvSpPr>
+            <p:cNvPr id="39" name="TextBox 38">
+              <a:extLst>
+                <a:ext uri="{FF2B5EF4-FFF2-40B4-BE49-F238E27FC236}">
+                  <a16:creationId xmlns:a16="http://schemas.microsoft.com/office/drawing/2014/main" id="{1C4CE86F-CF4E-4EC4-BF91-1E7FA88B7877}"/>
+                </a:ext>
+              </a:extLst>
+            </p:cNvPr>
+            <p:cNvSpPr txBox="1"/>
+            <p:nvPr/>
+          </p:nvSpPr>
+          <p:spPr>
+            <a:xfrm>
+              <a:off x="3112358" y="454335"/>
+              <a:ext cx="2265406" cy="307777"/>
+            </a:xfrm>
+            <a:prstGeom prst="rect">
+              <a:avLst/>
+            </a:prstGeom>
+            <a:noFill/>
+          </p:spPr>
+          <p:txBody>
+            <a:bodyPr wrap="square" rtlCol="0">
+              <a:spAutoFit/>
+            </a:bodyPr>
+            <a:lstStyle/>
+            <a:p>
+              <a:pPr algn="ctr"/>
+              <a:r>
+                <a:rPr lang="en-US" sz="1400" dirty="0">
+                  <a:solidFill>
+                    <a:srgbClr val="FF0000"/>
+                  </a:solidFill>
+                  <a:latin typeface="Comic Sans MS" panose="030F0702030302020204" pitchFamily="66" charset="0"/>
+                </a:rPr>
+                <a:t>function parameters</a:t>
+              </a:r>
+            </a:p>
+          </p:txBody>
+        </p:sp>
+        <p:cxnSp>
+          <p:nvCxnSpPr>
+            <p:cNvPr id="40" name="Straight Arrow Connector 39">
+              <a:extLst>
+                <a:ext uri="{FF2B5EF4-FFF2-40B4-BE49-F238E27FC236}">
+                  <a16:creationId xmlns:a16="http://schemas.microsoft.com/office/drawing/2014/main" id="{533150E6-DB08-41D8-99BA-E37FBCDE0CA3}"/>
+                </a:ext>
+              </a:extLst>
+            </p:cNvPr>
+            <p:cNvCxnSpPr>
+              <a:cxnSpLocks/>
+              <a:stCxn id="39" idx="2"/>
+            </p:cNvCxnSpPr>
+            <p:nvPr/>
+          </p:nvCxnSpPr>
+          <p:spPr>
+            <a:xfrm flipH="1">
+              <a:off x="3873842" y="762112"/>
+              <a:ext cx="371219" cy="650731"/>
+            </a:xfrm>
+            <a:prstGeom prst="straightConnector1">
+              <a:avLst/>
+            </a:prstGeom>
+            <a:ln>
+              <a:solidFill>
+                <a:srgbClr val="FF0000"/>
+              </a:solidFill>
+              <a:tailEnd type="triangle"/>
+            </a:ln>
+          </p:spPr>
+          <p:style>
+            <a:lnRef idx="1">
+              <a:schemeClr val="accent1"/>
+            </a:lnRef>
+            <a:fillRef idx="0">
+              <a:schemeClr val="accent1"/>
+            </a:fillRef>
+            <a:effectRef idx="0">
+              <a:schemeClr val="accent1"/>
+            </a:effectRef>
+            <a:fontRef idx="minor">
+              <a:schemeClr val="tx1"/>
+            </a:fontRef>
+          </p:style>
+        </p:cxnSp>
+        <p:cxnSp>
+          <p:nvCxnSpPr>
+            <p:cNvPr id="48" name="Straight Arrow Connector 47">
+              <a:extLst>
+                <a:ext uri="{FF2B5EF4-FFF2-40B4-BE49-F238E27FC236}">
+                  <a16:creationId xmlns:a16="http://schemas.microsoft.com/office/drawing/2014/main" id="{65403F5E-E004-4238-B029-CC3B5E431BC8}"/>
+                </a:ext>
+              </a:extLst>
+            </p:cNvPr>
+            <p:cNvCxnSpPr>
+              <a:cxnSpLocks/>
+              <a:stCxn id="39" idx="2"/>
+            </p:cNvCxnSpPr>
+            <p:nvPr/>
+          </p:nvCxnSpPr>
+          <p:spPr>
+            <a:xfrm flipH="1">
+              <a:off x="4043751" y="762112"/>
+              <a:ext cx="201310" cy="650731"/>
+            </a:xfrm>
+            <a:prstGeom prst="straightConnector1">
+              <a:avLst/>
+            </a:prstGeom>
+            <a:ln>
+              <a:solidFill>
+                <a:srgbClr val="FF0000"/>
+              </a:solidFill>
+              <a:tailEnd type="triangle"/>
+            </a:ln>
+          </p:spPr>
+          <p:style>
+            <a:lnRef idx="1">
+              <a:schemeClr val="accent1"/>
+            </a:lnRef>
+            <a:fillRef idx="0">
+              <a:schemeClr val="accent1"/>
+            </a:fillRef>
+            <a:effectRef idx="0">
+              <a:schemeClr val="accent1"/>
+            </a:effectRef>
+            <a:fontRef idx="minor">
+              <a:schemeClr val="tx1"/>
+            </a:fontRef>
+          </p:style>
+        </p:cxnSp>
+        <p:sp>
+          <p:nvSpPr>
+            <p:cNvPr id="51" name="TextBox 50">
+              <a:extLst>
+                <a:ext uri="{FF2B5EF4-FFF2-40B4-BE49-F238E27FC236}">
+                  <a16:creationId xmlns:a16="http://schemas.microsoft.com/office/drawing/2014/main" id="{4B08FA62-3043-455D-AC80-22E6DD6C3F64}"/>
+                </a:ext>
+              </a:extLst>
+            </p:cNvPr>
+            <p:cNvSpPr txBox="1"/>
+            <p:nvPr/>
+          </p:nvSpPr>
+          <p:spPr>
+            <a:xfrm>
+              <a:off x="1443680" y="904959"/>
+              <a:ext cx="2265406" cy="307777"/>
+            </a:xfrm>
+            <a:prstGeom prst="rect">
+              <a:avLst/>
+            </a:prstGeom>
+            <a:noFill/>
+          </p:spPr>
+          <p:txBody>
+            <a:bodyPr wrap="square" rtlCol="0">
+              <a:spAutoFit/>
+            </a:bodyPr>
+            <a:lstStyle/>
+            <a:p>
+              <a:pPr algn="ctr"/>
+              <a:r>
+                <a:rPr lang="en-US" sz="1400" dirty="0">
+                  <a:solidFill>
+                    <a:srgbClr val="FF0000"/>
+                  </a:solidFill>
+                  <a:latin typeface="Comic Sans MS" panose="030F0702030302020204" pitchFamily="66" charset="0"/>
+                </a:rPr>
+                <a:t>function name</a:t>
+              </a:r>
+            </a:p>
+          </p:txBody>
+        </p:sp>
+        <p:cxnSp>
+          <p:nvCxnSpPr>
+            <p:cNvPr id="52" name="Straight Arrow Connector 51">
+              <a:extLst>
+                <a:ext uri="{FF2B5EF4-FFF2-40B4-BE49-F238E27FC236}">
+                  <a16:creationId xmlns:a16="http://schemas.microsoft.com/office/drawing/2014/main" id="{BDD98AFE-50E9-4AEE-9EFC-95A0097E46A2}"/>
+                </a:ext>
+              </a:extLst>
+            </p:cNvPr>
+            <p:cNvCxnSpPr>
+              <a:cxnSpLocks/>
+            </p:cNvCxnSpPr>
+            <p:nvPr/>
+          </p:nvCxnSpPr>
+          <p:spPr>
+            <a:xfrm>
+              <a:off x="3112358" y="1165837"/>
+              <a:ext cx="383319" cy="247006"/>
+            </a:xfrm>
+            <a:prstGeom prst="straightConnector1">
+              <a:avLst/>
+            </a:prstGeom>
+            <a:ln>
+              <a:solidFill>
+                <a:srgbClr val="FF0000"/>
+              </a:solidFill>
+              <a:tailEnd type="triangle"/>
+            </a:ln>
+          </p:spPr>
+          <p:style>
+            <a:lnRef idx="1">
+              <a:schemeClr val="accent1"/>
+            </a:lnRef>
+            <a:fillRef idx="0">
+              <a:schemeClr val="accent1"/>
+            </a:fillRef>
+            <a:effectRef idx="0">
+              <a:schemeClr val="accent1"/>
+            </a:effectRef>
+            <a:fontRef idx="minor">
+              <a:schemeClr val="tx1"/>
+            </a:fontRef>
+          </p:style>
+        </p:cxnSp>
+        <p:sp>
+          <p:nvSpPr>
+            <p:cNvPr id="65" name="TextBox 64">
+              <a:extLst>
+                <a:ext uri="{FF2B5EF4-FFF2-40B4-BE49-F238E27FC236}">
+                  <a16:creationId xmlns:a16="http://schemas.microsoft.com/office/drawing/2014/main" id="{BE37231D-6A12-47E3-96EB-4D1DBD65B7B2}"/>
+                </a:ext>
+              </a:extLst>
+            </p:cNvPr>
+            <p:cNvSpPr txBox="1"/>
+            <p:nvPr/>
+          </p:nvSpPr>
+          <p:spPr>
+            <a:xfrm>
+              <a:off x="1249187" y="1450025"/>
+              <a:ext cx="1491048" cy="307777"/>
+            </a:xfrm>
+            <a:prstGeom prst="rect">
+              <a:avLst/>
+            </a:prstGeom>
+            <a:noFill/>
+          </p:spPr>
+          <p:txBody>
+            <a:bodyPr wrap="square" rtlCol="0">
+              <a:spAutoFit/>
+            </a:bodyPr>
+            <a:lstStyle/>
+            <a:p>
+              <a:pPr algn="r"/>
+              <a:r>
+                <a:rPr lang="en-US" sz="1400" dirty="0">
+                  <a:solidFill>
+                    <a:srgbClr val="FF0000"/>
+                  </a:solidFill>
+                  <a:latin typeface="Comic Sans MS" panose="030F0702030302020204" pitchFamily="66" charset="0"/>
+                </a:rPr>
+                <a:t>local variable</a:t>
+              </a:r>
+            </a:p>
+          </p:txBody>
+        </p:sp>
+        <p:sp>
+          <p:nvSpPr>
+            <p:cNvPr id="66" name="TextBox 65">
+              <a:extLst>
+                <a:ext uri="{FF2B5EF4-FFF2-40B4-BE49-F238E27FC236}">
+                  <a16:creationId xmlns:a16="http://schemas.microsoft.com/office/drawing/2014/main" id="{135A9EB2-67D7-4236-8B89-5771B73E8F81}"/>
+                </a:ext>
+              </a:extLst>
+            </p:cNvPr>
+            <p:cNvSpPr txBox="1"/>
+            <p:nvPr/>
+          </p:nvSpPr>
+          <p:spPr>
+            <a:xfrm>
+              <a:off x="878610" y="1890630"/>
+              <a:ext cx="1861625" cy="307777"/>
+            </a:xfrm>
+            <a:prstGeom prst="rect">
+              <a:avLst/>
+            </a:prstGeom>
+            <a:noFill/>
+          </p:spPr>
+          <p:txBody>
+            <a:bodyPr wrap="square" rtlCol="0">
+              <a:spAutoFit/>
+            </a:bodyPr>
+            <a:lstStyle/>
+            <a:p>
+              <a:pPr algn="r"/>
+              <a:r>
+                <a:rPr lang="en-US" sz="1400" dirty="0">
+                  <a:solidFill>
+                    <a:srgbClr val="FF0000"/>
+                  </a:solidFill>
+                  <a:latin typeface="Comic Sans MS" panose="030F0702030302020204" pitchFamily="66" charset="0"/>
+                </a:rPr>
+                <a:t>return statement</a:t>
+              </a:r>
+            </a:p>
+          </p:txBody>
+        </p:sp>
+        <p:cxnSp>
+          <p:nvCxnSpPr>
+            <p:cNvPr id="67" name="Straight Arrow Connector 66">
+              <a:extLst>
+                <a:ext uri="{FF2B5EF4-FFF2-40B4-BE49-F238E27FC236}">
+                  <a16:creationId xmlns:a16="http://schemas.microsoft.com/office/drawing/2014/main" id="{49EE04C7-C348-44F0-A00D-005555F16947}"/>
+                </a:ext>
+              </a:extLst>
+            </p:cNvPr>
+            <p:cNvCxnSpPr>
+              <a:cxnSpLocks/>
+            </p:cNvCxnSpPr>
+            <p:nvPr/>
+          </p:nvCxnSpPr>
+          <p:spPr>
+            <a:xfrm>
+              <a:off x="2740235" y="1595676"/>
+              <a:ext cx="678468" cy="45093"/>
+            </a:xfrm>
+            <a:prstGeom prst="straightConnector1">
+              <a:avLst/>
+            </a:prstGeom>
+            <a:ln>
+              <a:solidFill>
+                <a:srgbClr val="FF0000"/>
+              </a:solidFill>
+              <a:tailEnd type="triangle"/>
+            </a:ln>
+          </p:spPr>
+          <p:style>
+            <a:lnRef idx="1">
+              <a:schemeClr val="accent1"/>
+            </a:lnRef>
+            <a:fillRef idx="0">
+              <a:schemeClr val="accent1"/>
+            </a:fillRef>
+            <a:effectRef idx="0">
+              <a:schemeClr val="accent1"/>
+            </a:effectRef>
+            <a:fontRef idx="minor">
+              <a:schemeClr val="tx1"/>
+            </a:fontRef>
+          </p:style>
+        </p:cxnSp>
+        <p:cxnSp>
+          <p:nvCxnSpPr>
+            <p:cNvPr id="70" name="Straight Arrow Connector 69">
+              <a:extLst>
+                <a:ext uri="{FF2B5EF4-FFF2-40B4-BE49-F238E27FC236}">
+                  <a16:creationId xmlns:a16="http://schemas.microsoft.com/office/drawing/2014/main" id="{848632C5-857B-431F-9D25-6E929F830E32}"/>
+                </a:ext>
+              </a:extLst>
+            </p:cNvPr>
+            <p:cNvCxnSpPr>
+              <a:cxnSpLocks/>
+              <a:stCxn id="66" idx="3"/>
+            </p:cNvCxnSpPr>
+            <p:nvPr/>
+          </p:nvCxnSpPr>
+          <p:spPr>
+            <a:xfrm flipV="1">
+              <a:off x="2740235" y="1817883"/>
+              <a:ext cx="666108" cy="226636"/>
+            </a:xfrm>
+            <a:prstGeom prst="straightConnector1">
+              <a:avLst/>
+            </a:prstGeom>
+            <a:ln>
+              <a:solidFill>
+                <a:srgbClr val="FF0000"/>
+              </a:solidFill>
+              <a:tailEnd type="triangle"/>
+            </a:ln>
+          </p:spPr>
+          <p:style>
+            <a:lnRef idx="1">
+              <a:schemeClr val="accent1"/>
+            </a:lnRef>
+            <a:fillRef idx="0">
+              <a:schemeClr val="accent1"/>
+            </a:fillRef>
+            <a:effectRef idx="0">
+              <a:schemeClr val="accent1"/>
+            </a:effectRef>
+            <a:fontRef idx="minor">
+              <a:schemeClr val="tx1"/>
+            </a:fontRef>
+          </p:style>
+        </p:cxnSp>
+        <p:sp>
+          <p:nvSpPr>
+            <p:cNvPr id="75" name="Rectangle: Rounded Corners 74">
+              <a:extLst>
+                <a:ext uri="{FF2B5EF4-FFF2-40B4-BE49-F238E27FC236}">
+                  <a16:creationId xmlns:a16="http://schemas.microsoft.com/office/drawing/2014/main" id="{2F69E191-1666-4582-B68A-58D16CA71241}"/>
+                </a:ext>
+              </a:extLst>
+            </p:cNvPr>
+            <p:cNvSpPr/>
+            <p:nvPr/>
+          </p:nvSpPr>
+          <p:spPr>
+            <a:xfrm>
+              <a:off x="3304017" y="1570307"/>
+              <a:ext cx="1280160" cy="365760"/>
+            </a:xfrm>
+            <a:prstGeom prst="roundRect">
+              <a:avLst/>
+            </a:prstGeom>
+            <a:noFill/>
+            <a:ln w="19050">
+              <a:solidFill>
+                <a:srgbClr val="FF0000"/>
+              </a:solidFill>
+              <a:prstDash val="dash"/>
+            </a:ln>
+          </p:spPr>
+          <p:style>
+            <a:lnRef idx="2">
+              <a:schemeClr val="accent1">
+                <a:shade val="50000"/>
+              </a:schemeClr>
+            </a:lnRef>
+            <a:fillRef idx="1">
+              <a:schemeClr val="accent1"/>
+            </a:fillRef>
+            <a:effectRef idx="0">
+              <a:schemeClr val="accent1"/>
+            </a:effectRef>
+            <a:fontRef idx="minor">
+              <a:schemeClr val="lt1"/>
+            </a:fontRef>
+          </p:style>
+          <p:txBody>
+            <a:bodyPr rtlCol="0" anchor="ctr"/>
+            <a:lstStyle/>
+            <a:p>
+              <a:pPr algn="ctr"/>
+              <a:endParaRPr lang="en-US"/>
+            </a:p>
+          </p:txBody>
+        </p:sp>
+        <p:cxnSp>
+          <p:nvCxnSpPr>
+            <p:cNvPr id="76" name="Straight Arrow Connector 75">
+              <a:extLst>
+                <a:ext uri="{FF2B5EF4-FFF2-40B4-BE49-F238E27FC236}">
+                  <a16:creationId xmlns:a16="http://schemas.microsoft.com/office/drawing/2014/main" id="{EFC7A758-E56F-403B-B7D4-B096F9E78DE5}"/>
+                </a:ext>
+              </a:extLst>
+            </p:cNvPr>
+            <p:cNvCxnSpPr>
+              <a:cxnSpLocks/>
+              <a:stCxn id="77" idx="2"/>
+            </p:cNvCxnSpPr>
+            <p:nvPr/>
+          </p:nvCxnSpPr>
+          <p:spPr>
+            <a:xfrm flipH="1">
+              <a:off x="4584177" y="1192203"/>
+              <a:ext cx="1399790" cy="403473"/>
+            </a:xfrm>
+            <a:prstGeom prst="straightConnector1">
+              <a:avLst/>
+            </a:prstGeom>
+            <a:ln w="12700">
+              <a:solidFill>
+                <a:srgbClr val="FF0000"/>
+              </a:solidFill>
+              <a:prstDash val="dash"/>
+              <a:tailEnd type="triangle"/>
+            </a:ln>
+          </p:spPr>
+          <p:style>
+            <a:lnRef idx="1">
+              <a:schemeClr val="accent1"/>
+            </a:lnRef>
+            <a:fillRef idx="0">
+              <a:schemeClr val="accent1"/>
+            </a:fillRef>
+            <a:effectRef idx="0">
+              <a:schemeClr val="accent1"/>
+            </a:effectRef>
+            <a:fontRef idx="minor">
+              <a:schemeClr val="tx1"/>
+            </a:fontRef>
+          </p:style>
+        </p:cxnSp>
+        <p:sp>
+          <p:nvSpPr>
+            <p:cNvPr id="77" name="TextBox 76">
+              <a:extLst>
+                <a:ext uri="{FF2B5EF4-FFF2-40B4-BE49-F238E27FC236}">
+                  <a16:creationId xmlns:a16="http://schemas.microsoft.com/office/drawing/2014/main" id="{077F21B3-65F7-4558-A8BD-8966AB22C3D1}"/>
+                </a:ext>
+              </a:extLst>
+            </p:cNvPr>
+            <p:cNvSpPr txBox="1"/>
+            <p:nvPr/>
+          </p:nvSpPr>
+          <p:spPr>
+            <a:xfrm>
+              <a:off x="4851264" y="884426"/>
+              <a:ext cx="2265406" cy="307777"/>
+            </a:xfrm>
+            <a:prstGeom prst="rect">
+              <a:avLst/>
+            </a:prstGeom>
+            <a:noFill/>
+          </p:spPr>
+          <p:txBody>
+            <a:bodyPr wrap="square" rtlCol="0">
+              <a:spAutoFit/>
+            </a:bodyPr>
+            <a:lstStyle/>
+            <a:p>
+              <a:pPr algn="ctr"/>
+              <a:r>
+                <a:rPr lang="en-US" sz="1400" dirty="0">
+                  <a:solidFill>
+                    <a:srgbClr val="FF0000"/>
+                  </a:solidFill>
+                  <a:latin typeface="Comic Sans MS" panose="030F0702030302020204" pitchFamily="66" charset="0"/>
+                </a:rPr>
+                <a:t>function body</a:t>
+              </a:r>
+            </a:p>
+          </p:txBody>
+        </p:sp>
+      </p:grpSp>
+    </p:spTree>
+    <p:extLst>
+      <p:ext uri="{BB962C8B-B14F-4D97-AF65-F5344CB8AC3E}">
+        <p14:creationId xmlns:p14="http://schemas.microsoft.com/office/powerpoint/2010/main" val="1392091648"/>
+      </p:ext>
+    </p:extLst>
+  </p:cSld>
+  <p:clrMapOvr>
+    <a:masterClrMapping/>
+  </p:clrMapOvr>
+</p:sld>
+</file>
+
+<file path=ppt/slides/slide4.xml><?xml version="1.0" encoding="utf-8"?>
+<p:sld xmlns:a="http://schemas.openxmlformats.org/drawingml/2006/main" xmlns:r="http://schemas.openxmlformats.org/officeDocument/2006/relationships" xmlns:p="http://schemas.openxmlformats.org/presentationml/2006/main">
+  <p:cSld>
+    <p:spTree>
+      <p:nvGrpSpPr>
+        <p:cNvPr id="1" name=""/>
+        <p:cNvGrpSpPr/>
+        <p:nvPr/>
+      </p:nvGrpSpPr>
+      <p:grpSpPr>
+        <a:xfrm>
+          <a:off x="0" y="0"/>
+          <a:ext cx="0" cy="0"/>
+          <a:chOff x="0" y="0"/>
+          <a:chExt cx="0" cy="0"/>
+        </a:xfrm>
+      </p:grpSpPr>
       <p:sp>
         <p:nvSpPr>
           <p:cNvPr id="2" name="Rectangle 1">

</xml_diff>